<commit_message>
Add event name to the slides
</commit_message>
<xml_diff>
--- a/Talks 2012/Information-rich F# (ML Copenhagen)/ml-talk.pptx
+++ b/Talks 2012/Information-rich F# (ML Copenhagen)/ml-talk.pptx
@@ -4452,7 +4452,7 @@
           <inkml:trace contextRef="#ctx0" brushRef="#br0" timeOffset="2090.4036">-3935-3490 73,'-6'3'0,"6"-3"9,14 35-9,-14-35 1,34 53-1,-34-53 32,48 110-32,-48-110 11,34 124-11,-34-124 5,51 183-5,-51-183 10,28 143-10,-28-143 1,11 97-1,-11-97-67,20 51 67,-20-51 66,0 0-66,0 0 2,6-51-2,-6 51 3,5-86-3,-5 86-1,-8-86 1,8 86 7,-6-108-7,6 108 5,-19-110-5,19 110-14,-3-97 14,3 97 1,8-106-1,-8 106 1,26-73-1,-26 73-1,28-44 1,-28 44-57,39 20 57,-39-20 55,45 64-55,-45-64 1,51 83-1,-51-83 2,45 75-2,-45-75 5,17 29-5,-17-29 4,-5 18-4,5-18 4,-45 9-4,45-9 1,-82-11-1,82 11 1,-99-34-1,99 34 0,-54-24 0,54 24-12,0 0-136</inkml:trace>
           <inkml:trace contextRef="#ctx0" brushRef="#br0" timeOffset="2761.2045">-3421-3820 76,'-3'-5'0,"3"5"8,3 9-8,-3-9 5,16 46-5,-16-46-6,26 78 6,-26-78 40,20 163-40,-20-163 17,22 156-17,-22-156 95,14 126-95,-14-126-78,26 71 78,-26-71 0,25 28 0,-25-28-1,0 0-155</inkml:trace>
           <inkml:trace contextRef="#ctx0" brushRef="#br0" timeOffset="3400.8059">-3215-3329 95,'31'25'0,"-31"-25"5,59 17-5,-59-17 1,73-6-1,-73 6 18,79-25-18,-79 25 10,57-28-10,-57 28 8,39-24-8,-39 24 3,23-51-3,-23 51 0,-6-33 0,6 33-60,-34-29 60,34 29 60,-59-7-60,59 7 1,-85 9-1,85-9-4,-76 47 4,76-47-63,-17 44 63,17-44 62,0 53-62,0-53 1,26 66-1,-26-66 5,59 64-5,-59-64 27,93 31-27,-93-31 21,110 33-21,-110-33 13,116-3-13,-116 3 2,82-15-2,-82 15-2,0 0-201</inkml:trace>
-          <inkml:trace contextRef="#ctx0" brushRef="#br0" timeOffset="4586.4073">-2281-3324 87,'8'0'0,"-8"0"10,11 9-10,-11-9 22,12 46-22,-12-46 10,5 97-10,-5-97 6,3 150-6,-3-150 2,17 108-2,-17-108 2,0 0-141</inkml:trace>
+          <inkml:trace contextRef="#ctx0" brushRef="#br0" timeOffset="4586.4072">-2281-3324 87,'8'0'0,"-8"0"10,11 9-10,-11-9 22,12 46-22,-12-46 10,5 97-10,-5-97 6,3 150-6,-3-150 2,17 108-2,-17-108 2,0 0-141</inkml:trace>
         </inkml:traceGroup>
         <inkml:traceGroup>
           <inkml:annotationXML>
@@ -5214,7 +5214,7 @@
               </emma:one-of>
             </emma:emma>
           </inkml:annotationXML>
-          <inkml:trace contextRef="#ctx0" brushRef="#br0" timeOffset="1263.602">980 25 37,'0'-3'0,"0"3"29,2-6-29,-2 6 18,-2 2-18,2-2 6,0 2-6,0-2 3,0 2-3,0-2 2,9 18-2,-9-18 4,12 59-4,-12-59 17,19 90-17,-19-90 12,11 101-12,-11-101 11,10 92-11,-10-92 6,12 89-6,-12-89 14,7 51-14,-7-51 11,14 35-11,-14-35 24,12 30-24,-12-30-2,7 26 2,-7-26-14,2 3 14,-2-3 0,7-2 0,-7 2 11,-5-1-11,5 1 42,0 1-42,0-1-62,0-1 62,0 1-23,3 5 23,-3-5-18,0 0-110</inkml:trace>
+          <inkml:trace contextRef="#ctx0" brushRef="#br0" timeOffset="1263.6019">980 25 37,'0'-3'0,"0"3"29,2-6-29,-2 6 18,-2 2-18,2-2 6,0 2-6,0-2 3,0 2-3,0-2 2,9 18-2,-9-18 4,12 59-4,-12-59 17,19 90-17,-19-90 12,11 101-12,-11-101 11,10 92-11,-10-92 6,12 89-6,-12-89 14,7 51-14,-7-51 11,14 35-11,-14-35 24,12 30-24,-12-30-2,7 26 2,-7-26-14,2 3 14,-2-3 0,7-2 0,-7 2 11,-5-1-11,5 1 42,0 1-42,0-1-62,0-1 62,0 1-23,3 5 23,-3-5-18,0 0-110</inkml:trace>
           <inkml:trace contextRef="#ctx0" brushRef="#br0" timeOffset="2012.4035">987 14 48,'-5'-7'0,"5"7"27,5-11-27,-5 11 12,23-22-12,-23 22 0,36-15 0,-36 15 12,54-7-12,-54 7 5,59 9-5,-59-9 8,63 22-8,-63-22 6,62 44-6,-62-44 8,44 50-8,-44-50 6,26 66-6,-26-66 1,10 57-1,-10-57-1,-10 41 1,10-41-1,-16 33 1,16-33 0,-47 29 0,47-29-1,-62 17 1,62-17-1,-56-4 1,56 4 0,-50-7 0,50 7-1,-33-4 1,33 4 0,-9 0 0,9 0-1,-5 4 1,5-4-1,-9 11 1,9-11 1,-10 16-1,10-16 0,3 11 0,-3-11 3,2 23-3,-2-23 7,19 22-7,-19-22 8,47 36-8,-47-36 14,52 48-14,-52-48 14,64 41-14,-64-41 10,68 33-10,-68-33 9,56 48-9,-56-48 4,69 49-4,-69-49 3,70 48-3,-70-48 0,47 22 0,-47-22 1,45 19-1,-45-19-8,0 0-184</inkml:trace>
           <inkml:trace contextRef="#ctx0" brushRef="#br0" timeOffset="2823.6049">1741 487 50,'26'-7'0,"-26"7"50,35-18-50,-35 18-1,33-24 1,-33 24 17,23-35-17,-23 35 1,7-28-1,-7 28 0,0-18 0,0 18 0,-18-21 0,18 21-3,-24-14 3,24 14-14,-47-13 14,47 13 1,-54-8-1,54 8-20,-31 8 20,31-8 11,-35 15-11,35-15 5,-38 33-5,38-33 3,-23 40-3,23-40-7,-17 44 7,17-44 14,2 39-14,-2-39 19,12 40-19,-12-40 13,24 30-13,-24-30 5,30 39-5,-30-39 13,36 40-13,-36-40 3,40 33-3,-40-33 0,49 9 0,-49-9 0,57-5 0,-57 5-5,42-19 5,-42 19-33,54-31 33,-54 31-51,0 0-20</inkml:trace>
           <inkml:trace contextRef="#ctx0" brushRef="#br0" timeOffset="3603.6063">2096 473 76,'-4'-21'0,"4"21"17,-10-22-17,10 22-6,-16-7 6,16 7-11,-5-4 11,5 4 30,-21 4-30,21-4-10,-21 20 10,21-20-1,-26 37 1,26-37 8,-24 24-8,24-24 11,-14 20-11,14-20 6,7 28-6,-7-28 18,19 35-18,-19-35 6,21 38-6,-21-38-1,31 22 1,-31-22 13,33 4-13,-33-4 4,42-27-4,-42 27-2,38-57 2,-38 57 1,33-43-1,-33 43-1,30-62 1,-30 62 2,15-78-2,-15 78-1,-3-81 1,3 81-1,-9-81 1,9 81-3,-26-81 3,26 81-10,-17-82 10,17 82-1,-2-63 1,2 63 1,-2-46-1,2 46 8,-10-24-8,10 24-72,-7-18 72,7 18 62,3-21-62,-3 21 0,-8-11 0,8 11 2,-4-5-2,4 5 0,2-2 0,-2 2-5,2 4 5,-2-4-12,-4 42 12,4-42-5,0 50 5,0-50 2,7 73-2,-7-73 10,9 127-10,-9-127 20,14 135-20,-14-135 10,22 134-10,-22-134 9,26 88-9,-26-88 31,25 63-31,-25-63-11,31 51 11,-31-51-1,50 26 1,-50-26 1,42-15-1,-42 15-26,0 0-142</inkml:trace>
@@ -5778,7 +5778,7 @@
           <inkml:trace contextRef="#ctx0" brushRef="#br0" timeOffset="91837.3613">-361 1321 68,'20'-3'0,"-20"3"4,11 18-4,-11-18 4,3 66-4,-3-66 11,-17 75-11,17-75 23,-14 102-23,14-102 17,-20 97-17,20-97 1,-8 55-1,8-55 1,-3 33-1,3-33-1,0 0-127</inkml:trace>
           <inkml:trace contextRef="#ctx0" brushRef="#br0" timeOffset="92305.3621">-375 1550 92,'11'0'0,"-11"0"29,62 9-29,-62-9 4,68 9-4,-68-9 2,0 0-129</inkml:trace>
           <inkml:trace contextRef="#ctx0" brushRef="#br0" timeOffset="92102.5618">-364 1321 72,'11'-11'0,"-11"11"10,31 13-10,-31-13 5,40 51-5,-40-51 4,45 90-4,-45-90 6,31 106-6,-31-106 21,37 97-21,-37-97 3,34 46-3,-34-46 4,25 18-4,-25-18-11,9 6 11,-9-6-86,0 0 58</inkml:trace>
-          <inkml:trace contextRef="#ctx0" brushRef="#br0" timeOffset="92710.9622">-53 1318 75,'5'5'0,"-5"-5"-12,20 22 12,-20-22 3,23 42-3,-23-42 17,17 66-17,-17-66 19,11 90-19,-11-90 13,8 89-13,-8-89 3,17 57-3,-17-57-1,23 31 1,-23-31 1,14 11-1,-14-11-1,6-9 1,-6 9-1,0 0-115</inkml:trace>
+          <inkml:trace contextRef="#ctx0" brushRef="#br0" timeOffset="92710.9621">-53 1318 75,'5'5'0,"-5"-5"-12,20 22 12,-20-22 3,23 42-3,-23-42 17,17 66-17,-17-66 19,11 90-19,-11-90 13,8 89-13,-8-89 3,17 57-3,-17-57-1,23 31 1,-23-31 1,14 11-1,-14-11-1,6-9 1,-6 9-1,0 0-115</inkml:trace>
           <inkml:trace contextRef="#ctx0" brushRef="#br0" timeOffset="93132.1636">-39 1402 85,'11'-22'0,"-11"22"8,20-26-8,-20 26-11,20-20 11,-20 20 23,56-22-23,-56 22 9,48-2-9,-48 2 2,48 17-2,-48-17 3,34 53-3,-34-53 4,5 60-4,-5-60 0,-8 48 0,8-48 0,-11 44 0,11-44 0,-34 29 0,34-29-3,-43 7 3,43-7-8,-31-9 8,31 9-13,-11 9 13,11-9 17,0 30-17,0-30-1,26 38 1,-26-38 4,31 37-4,-31-37 18,39 22-18,-39-22 6,59 18-6,-59-18 13,51 18-13,-51-18-5,42 31 5,-42-31-73,0 0-5</inkml:trace>
           <inkml:trace contextRef="#ctx0" brushRef="#br0" timeOffset="93709.3646">435 1415 75,'-14'3'0,"14"-3"22,-31 6-22,31-6 2,-29 29-2,29-29 6,-11 22-6,11-22 2,14 71-2,-14-71 10,40 88-10,-40-88 4,45 59-4,-45-59 1,76 22-1,-76-22-22,79-4 22,-79 4-6,51-29 6,-51 29-10,25-62 10,-25 62 47,0-105-47,0 105-1,-42-104 1,42 104 0,-65-86 0,65 86 0,-62-18 0,62 18 0,-54 40 0,54-40 7,-25 55-7,25-55 1,0 0-139</inkml:trace>
           <inkml:trace contextRef="#ctx0" brushRef="#br0" timeOffset="94068.1653">525 1528 25,'-11'26'0,"11"-26"72,6 22-72,-6-22 10,31 36-10,-31-36 18,39 42-18,-39-42 18,48 37-18,-48-37 16,48 35-16,-48-35 4,40 31-4,-40-31 1,0 0-165</inkml:trace>
@@ -5867,7 +5867,7 @@
           <inkml:trace contextRef="#ctx0" brushRef="#br0" timeOffset="101805.7789">-779 2097 72,'3'2'0,"-3"-2"28,-3-2-28,3 2-3,3 31 3,-3-31-16,3 79 16,-3-79 14,20 112-14,-20-112 40,28 148-40,-28-148 12,45 124-12,-45-124 0,25 72 0,-25-72 3,12 20-3,-12-20 0,5-13 0,-5 13-67,-22-66 67,22 66-5,0 0-73</inkml:trace>
           <inkml:trace contextRef="#ctx0" brushRef="#br0" timeOffset="102242.5796">-770 2152 95,'25'-40'0,"-25"40"11,48-44-11,-48 44 20,79-13-20,-79 13 7,71 24-7,-71-24 1,45 46-1,-45-46 2,8 75-2,-8-75 1,-11 67-1,11-67 1,-31 59-1,31-59 0,-45 46 0,45-46 0,-11 20 0,11-20-1,11 16 1,-11-16-1,31 24 1,-31-24 1,65 24-1,-65-24 0,68 9 0,-68-9 0,56 33 0,-56-33 1,17 42-1,-17-42-1,-11 53 1,11-53 0,-29 66 0,29-66 0,-42 44 0,42-44 1,-51 7-1,51-7 9,-76-16-9,76 16 4,-90-33-4,90 33-1,-14-24 1,14 24-6,0 0-138</inkml:trace>
           <inkml:trace contextRef="#ctx0" brushRef="#br0" timeOffset="103521.7819">-138 2405 67,'8'-11'0,"-8"11"-6,12-17 6,-12 17 23,3-13-23,-3 13 21,5-12-21,-5 12 3,11-13-3,-11 13 8,34-13-8,-34 13 0,82-7 0,-82 7-1,90 25 1,-90-25-1,48 70 1,-48-70 2,9 75-2,-9-75 0,-3 62 0,3-62-1,-22 46 1,22-46 3,-34 22-3,34-22-1,-57 5 1,57-5 1,-101-5-1,101 5-1,-43-2 1,43 2 1,-3 2-1,3-2-1,15-17 1,-15 17 2,39-9-2,-39 9 5,42-18-5,-42 18-3,23-33 3,-23 33 0,34-37 0,-34 37 0,37-25 0,-37 25-2,39 16 2,-39-16-2,31 55 2,-31-55 3,34 73-3,-34-73-1,31 66 1,-31-66 3,28 31-3,-28-31-1,0 0-120</inkml:trace>
-          <inkml:trace contextRef="#ctx0" brushRef="#br0" timeOffset="104020.982">494 2304 99,'-28'-24'0,"28"24"5,-23-2-5,23 2 2,-19 11-2,19-11 2,-34 26-2,34-26 9,-17 51-9,17-51 0,17 68 0,-17-68-1,39 55 1,-39-55-9,45 40 9,-45-40-17,48 35 17,-48-35-9,31 27 9,-31-27 14,6 15-14,-6-15 4,-17 9-4,17-9 17,-31 4-17,31-4-46,-48-9 46,48 9 21,-39-13-21,39 13-15,-3 0 15,3 0 55,-3 18-55,3-18-3,0 0-125</inkml:trace>
+          <inkml:trace contextRef="#ctx0" brushRef="#br0" timeOffset="104020.9819">494 2304 99,'-28'-24'0,"28"24"5,-23-2-5,23 2 2,-19 11-2,19-11 2,-34 26-2,34-26 9,-17 51-9,17-51 0,17 68 0,-17-68-1,39 55 1,-39-55-9,45 40 9,-45-40-17,48 35 17,-48-35-9,31 27 9,-31-27 14,6 15-14,-6-15 4,-17 9-4,17-9 17,-31 4-17,31-4-46,-48-9 46,48 9 21,-39-13-21,39 13-15,-3 0 15,3 0 55,-3 18-55,3-18-3,0 0-125</inkml:trace>
           <inkml:trace contextRef="#ctx0" brushRef="#br0" timeOffset="104566.9837">717 2450 87,'23'-5'0,"-23"5"27,22-20-27,-22 20 4,37-2-4,-37 2 3,28-7-3,-28 7 4,14-8-4,-14 8 0,9-14 0,-9 14 3,0-44-3,0 44-2,-14-42 2,14 42 0,-26-33 0,26 33 0,-36-15 0,36 15-1,-43 13 1,43-13 1,-56 49-1,56-49 0,-40 64 0,40-64 1,-31 61-1,31-61-1,-11 38 1,11-38 1,3 28-1,-3-28 13,42 38-13,-42-38 21,51 37-21,-51-37 16,85 22-16,-85-22 18,101 3-18,-101-3 2,110-3-2,-110 3 1,0 0-199</inkml:trace>
           <inkml:trace contextRef="#ctx0" brushRef="#br0" timeOffset="107109.7882">1293 2524 76,'-6'0'0,"6"0"21,0 7-21,0-7 1,26 18-1,-26-18 22,45 46-22,-45-46 13,28 62-13,-28-62 5,28 70-5,-28-70-1,9 47 1,-9-47 1,0 0-139</inkml:trace>
         </inkml:traceGroup>
@@ -6153,7 +6153,7 @@
           <a:p>
             <a:fld id="{89ECE038-53B5-499C-B0E0-E312DCF7E711}" type="datetimeFigureOut">
               <a:rPr lang="cs-CZ" smtClean="0"/>
-              <a:t>13.9.2012</a:t>
+              <a:t>19.9.2012</a:t>
             </a:fld>
             <a:endParaRPr lang="cs-CZ"/>
           </a:p>
@@ -6770,7 +6770,7 @@
           <a:p>
             <a:fld id="{61C73689-EA21-4870-97E4-1E93FA434258}" type="datetimeFigureOut">
               <a:rPr lang="en-US" smtClean="0"/>
-              <a:t>9/13/2012</a:t>
+              <a:t>9/19/2012</a:t>
             </a:fld>
             <a:endParaRPr lang="en-US"/>
           </a:p>
@@ -7023,7 +7023,7 @@
           <a:p>
             <a:fld id="{61C73689-EA21-4870-97E4-1E93FA434258}" type="datetimeFigureOut">
               <a:rPr lang="en-US" smtClean="0"/>
-              <a:t>9/13/2012</a:t>
+              <a:t>9/19/2012</a:t>
             </a:fld>
             <a:endParaRPr lang="en-US"/>
           </a:p>
@@ -7193,7 +7193,7 @@
           <a:p>
             <a:fld id="{61C73689-EA21-4870-97E4-1E93FA434258}" type="datetimeFigureOut">
               <a:rPr lang="en-US" smtClean="0"/>
-              <a:t>9/13/2012</a:t>
+              <a:t>9/19/2012</a:t>
             </a:fld>
             <a:endParaRPr lang="en-US"/>
           </a:p>
@@ -7373,7 +7373,7 @@
           <a:p>
             <a:fld id="{61C73689-EA21-4870-97E4-1E93FA434258}" type="datetimeFigureOut">
               <a:rPr lang="en-US" smtClean="0"/>
-              <a:t>9/13/2012</a:t>
+              <a:t>9/19/2012</a:t>
             </a:fld>
             <a:endParaRPr lang="en-US"/>
           </a:p>
@@ -7599,7 +7599,7 @@
           <a:p>
             <a:fld id="{61C73689-EA21-4870-97E4-1E93FA434258}" type="datetimeFigureOut">
               <a:rPr lang="en-US" smtClean="0"/>
-              <a:t>9/13/2012</a:t>
+              <a:t>9/19/2012</a:t>
             </a:fld>
             <a:endParaRPr lang="en-US"/>
           </a:p>
@@ -7814,7 +7814,7 @@
           <a:p>
             <a:fld id="{61C73689-EA21-4870-97E4-1E93FA434258}" type="datetimeFigureOut">
               <a:rPr lang="en-US" smtClean="0"/>
-              <a:t>9/13/2012</a:t>
+              <a:t>9/19/2012</a:t>
             </a:fld>
             <a:endParaRPr lang="en-US"/>
           </a:p>
@@ -8060,7 +8060,7 @@
           <a:p>
             <a:fld id="{61C73689-EA21-4870-97E4-1E93FA434258}" type="datetimeFigureOut">
               <a:rPr lang="en-US" smtClean="0"/>
-              <a:t>9/13/2012</a:t>
+              <a:t>9/19/2012</a:t>
             </a:fld>
             <a:endParaRPr lang="en-US"/>
           </a:p>
@@ -8348,7 +8348,7 @@
           <a:p>
             <a:fld id="{61C73689-EA21-4870-97E4-1E93FA434258}" type="datetimeFigureOut">
               <a:rPr lang="en-US" smtClean="0"/>
-              <a:t>9/13/2012</a:t>
+              <a:t>9/19/2012</a:t>
             </a:fld>
             <a:endParaRPr lang="en-US"/>
           </a:p>
@@ -8770,7 +8770,7 @@
           <a:p>
             <a:fld id="{61C73689-EA21-4870-97E4-1E93FA434258}" type="datetimeFigureOut">
               <a:rPr lang="en-US" smtClean="0"/>
-              <a:t>9/13/2012</a:t>
+              <a:t>9/19/2012</a:t>
             </a:fld>
             <a:endParaRPr lang="en-US"/>
           </a:p>
@@ -8888,7 +8888,7 @@
           <a:p>
             <a:fld id="{61C73689-EA21-4870-97E4-1E93FA434258}" type="datetimeFigureOut">
               <a:rPr lang="en-US" smtClean="0"/>
-              <a:t>9/13/2012</a:t>
+              <a:t>9/19/2012</a:t>
             </a:fld>
             <a:endParaRPr lang="en-US"/>
           </a:p>
@@ -8983,7 +8983,7 @@
           <a:p>
             <a:fld id="{61C73689-EA21-4870-97E4-1E93FA434258}" type="datetimeFigureOut">
               <a:rPr lang="en-US" smtClean="0"/>
-              <a:t>9/13/2012</a:t>
+              <a:t>9/19/2012</a:t>
             </a:fld>
             <a:endParaRPr lang="en-US"/>
           </a:p>
@@ -9260,7 +9260,7 @@
           <a:p>
             <a:fld id="{61C73689-EA21-4870-97E4-1E93FA434258}" type="datetimeFigureOut">
               <a:rPr lang="en-US" smtClean="0"/>
-              <a:t>9/13/2012</a:t>
+              <a:t>9/19/2012</a:t>
             </a:fld>
             <a:endParaRPr lang="en-US"/>
           </a:p>
@@ -9473,7 +9473,7 @@
           <a:p>
             <a:fld id="{61C73689-EA21-4870-97E4-1E93FA434258}" type="datetimeFigureOut">
               <a:rPr lang="en-US" smtClean="0"/>
-              <a:t>9/13/2012</a:t>
+              <a:t>9/19/2012</a:t>
             </a:fld>
             <a:endParaRPr lang="en-US"/>
           </a:p>
@@ -9929,7 +9929,7 @@
         </p:nvSpPr>
         <p:spPr>
           <a:xfrm>
-            <a:off x="762000" y="4953000"/>
+            <a:off x="762000" y="4419600"/>
             <a:ext cx="7620000" cy="1066800"/>
           </a:xfrm>
         </p:spPr>
@@ -10020,7 +10020,7 @@
         </p:nvCxnSpPr>
         <p:spPr>
           <a:xfrm>
-            <a:off x="8534400" y="5105400"/>
+            <a:off x="8534400" y="4572000"/>
             <a:ext cx="0" cy="762000"/>
           </a:xfrm>
           <a:prstGeom prst="line">
@@ -10050,6 +10050,46 @@
           </a:fontRef>
         </p:style>
       </p:cxnSp>
+      <p:sp>
+        <p:nvSpPr>
+          <p:cNvPr id="4" name="TextBox 3"/>
+          <p:cNvSpPr txBox="1"/>
+          <p:nvPr/>
+        </p:nvSpPr>
+        <p:spPr>
+          <a:xfrm>
+            <a:off x="76200" y="6412468"/>
+            <a:ext cx="8915400" cy="369332"/>
+          </a:xfrm>
+          <a:prstGeom prst="rect">
+            <a:avLst/>
+          </a:prstGeom>
+          <a:noFill/>
+        </p:spPr>
+        <p:txBody>
+          <a:bodyPr wrap="square" rtlCol="0">
+            <a:spAutoFit/>
+          </a:bodyPr>
+          <a:lstStyle/>
+          <a:p>
+            <a:r>
+              <a:rPr lang="en-US" b="1" dirty="0" smtClean="0">
+                <a:latin typeface="+mj-lt"/>
+              </a:rPr>
+              <a:t>ML Workshop </a:t>
+            </a:r>
+            <a:r>
+              <a:rPr lang="en-US" dirty="0" smtClean="0">
+                <a:latin typeface="+mj-lt"/>
+              </a:rPr>
+              <a:t>(Copenhagen, 13 September, 2012)</a:t>
+            </a:r>
+            <a:endParaRPr lang="cs-CZ" dirty="0">
+              <a:latin typeface="+mj-lt"/>
+            </a:endParaRPr>
+          </a:p>
+        </p:txBody>
+      </p:sp>
     </p:spTree>
     <p:extLst>
       <p:ext uri="{BB962C8B-B14F-4D97-AF65-F5344CB8AC3E}">

</xml_diff>